<commit_message>
lab2-3 * task added
</commit_message>
<xml_diff>
--- a/lecture-01.pptx
+++ b/lecture-01.pptx
@@ -230,7 +230,7 @@
           <a:p>
             <a:fld id="{BD589D72-A080-4A79-B96C-EAF4279EA27C}" type="datetimeFigureOut">
               <a:rPr lang="ru-RU" smtClean="0"/>
-              <a:t>03.09.2019</a:t>
+              <a:t>02.09.2020</a:t>
             </a:fld>
             <a:endParaRPr lang="ru-RU"/>
           </a:p>
@@ -4877,7 +4877,7 @@
           <a:p>
             <a:fld id="{B4C71EC6-210F-42DE-9C53-41977AD35B3D}" type="datetimeFigureOut">
               <a:rPr lang="ru-RU" smtClean="0"/>
-              <a:t>03.09.2019</a:t>
+              <a:t>02.09.2020</a:t>
             </a:fld>
             <a:endParaRPr lang="ru-RU"/>
           </a:p>
@@ -5042,7 +5042,7 @@
           <a:p>
             <a:fld id="{B4C71EC6-210F-42DE-9C53-41977AD35B3D}" type="datetimeFigureOut">
               <a:rPr lang="ru-RU" smtClean="0"/>
-              <a:t>03.09.2019</a:t>
+              <a:t>02.09.2020</a:t>
             </a:fld>
             <a:endParaRPr lang="ru-RU"/>
           </a:p>
@@ -5217,7 +5217,7 @@
           <a:p>
             <a:fld id="{B4C71EC6-210F-42DE-9C53-41977AD35B3D}" type="datetimeFigureOut">
               <a:rPr lang="ru-RU" smtClean="0"/>
-              <a:t>03.09.2019</a:t>
+              <a:t>02.09.2020</a:t>
             </a:fld>
             <a:endParaRPr lang="ru-RU"/>
           </a:p>
@@ -5382,7 +5382,7 @@
           <a:p>
             <a:fld id="{B4C71EC6-210F-42DE-9C53-41977AD35B3D}" type="datetimeFigureOut">
               <a:rPr lang="ru-RU" smtClean="0"/>
-              <a:t>03.09.2019</a:t>
+              <a:t>02.09.2020</a:t>
             </a:fld>
             <a:endParaRPr lang="ru-RU"/>
           </a:p>
@@ -5623,7 +5623,7 @@
           <a:p>
             <a:fld id="{B4C71EC6-210F-42DE-9C53-41977AD35B3D}" type="datetimeFigureOut">
               <a:rPr lang="ru-RU" smtClean="0"/>
-              <a:t>03.09.2019</a:t>
+              <a:t>02.09.2020</a:t>
             </a:fld>
             <a:endParaRPr lang="ru-RU"/>
           </a:p>
@@ -5906,7 +5906,7 @@
           <a:p>
             <a:fld id="{B4C71EC6-210F-42DE-9C53-41977AD35B3D}" type="datetimeFigureOut">
               <a:rPr lang="ru-RU" smtClean="0"/>
-              <a:t>03.09.2019</a:t>
+              <a:t>02.09.2020</a:t>
             </a:fld>
             <a:endParaRPr lang="ru-RU"/>
           </a:p>
@@ -6323,7 +6323,7 @@
           <a:p>
             <a:fld id="{B4C71EC6-210F-42DE-9C53-41977AD35B3D}" type="datetimeFigureOut">
               <a:rPr lang="ru-RU" smtClean="0"/>
-              <a:t>03.09.2019</a:t>
+              <a:t>02.09.2020</a:t>
             </a:fld>
             <a:endParaRPr lang="ru-RU"/>
           </a:p>
@@ -6436,7 +6436,7 @@
           <a:p>
             <a:fld id="{B4C71EC6-210F-42DE-9C53-41977AD35B3D}" type="datetimeFigureOut">
               <a:rPr lang="ru-RU" smtClean="0"/>
-              <a:t>03.09.2019</a:t>
+              <a:t>02.09.2020</a:t>
             </a:fld>
             <a:endParaRPr lang="ru-RU"/>
           </a:p>
@@ -6526,7 +6526,7 @@
           <a:p>
             <a:fld id="{B4C71EC6-210F-42DE-9C53-41977AD35B3D}" type="datetimeFigureOut">
               <a:rPr lang="ru-RU" smtClean="0"/>
-              <a:t>03.09.2019</a:t>
+              <a:t>02.09.2020</a:t>
             </a:fld>
             <a:endParaRPr lang="ru-RU"/>
           </a:p>
@@ -6798,7 +6798,7 @@
           <a:p>
             <a:fld id="{B4C71EC6-210F-42DE-9C53-41977AD35B3D}" type="datetimeFigureOut">
               <a:rPr lang="ru-RU" smtClean="0"/>
-              <a:t>03.09.2019</a:t>
+              <a:t>02.09.2020</a:t>
             </a:fld>
             <a:endParaRPr lang="ru-RU"/>
           </a:p>
@@ -7046,7 +7046,7 @@
           <a:p>
             <a:fld id="{B4C71EC6-210F-42DE-9C53-41977AD35B3D}" type="datetimeFigureOut">
               <a:rPr lang="ru-RU" smtClean="0"/>
-              <a:t>03.09.2019</a:t>
+              <a:t>02.09.2020</a:t>
             </a:fld>
             <a:endParaRPr lang="ru-RU"/>
           </a:p>
@@ -7263,7 +7263,7 @@
           <a:p>
             <a:fld id="{B4C71EC6-210F-42DE-9C53-41977AD35B3D}" type="datetimeFigureOut">
               <a:rPr lang="ru-RU" smtClean="0"/>
-              <a:t>03.09.2019</a:t>
+              <a:t>02.09.2020</a:t>
             </a:fld>
             <a:endParaRPr lang="ru-RU"/>
           </a:p>
@@ -16951,16 +16951,7 @@
                 </a:solidFill>
                 <a:latin typeface="+mj-lt"/>
               </a:rPr>
-              <a:t> </a:t>
-            </a:r>
-            <a:r>
-              <a:rPr lang="ru-RU" altLang="ru-RU" sz="2000" b="1" dirty="0" smtClean="0">
-                <a:solidFill>
-                  <a:schemeClr val="tx1"/>
-                </a:solidFill>
-                <a:latin typeface="+mj-lt"/>
-              </a:rPr>
-              <a:t>- </a:t>
+              <a:t> - </a:t>
             </a:r>
             <a:r>
               <a:rPr lang="ru-RU" sz="2000" dirty="0" smtClean="0">
@@ -18155,16 +18146,7 @@
                 </a:solidFill>
                 <a:latin typeface="+mj-lt"/>
               </a:rPr>
-              <a:t> </a:t>
-            </a:r>
-            <a:r>
-              <a:rPr lang="ru-RU" altLang="ru-RU" sz="2000" b="1" dirty="0" smtClean="0">
-                <a:solidFill>
-                  <a:schemeClr val="tx1"/>
-                </a:solidFill>
-                <a:latin typeface="+mj-lt"/>
-              </a:rPr>
-              <a:t>- </a:t>
+              <a:t> - </a:t>
             </a:r>
             <a:r>
               <a:rPr lang="en" sz="2000" dirty="0" smtClean="0">
@@ -21728,13 +21710,7 @@
               <a:rPr lang="ru-RU" sz="4000" dirty="0" smtClean="0">
                 <a:latin typeface="+mj-lt"/>
               </a:rPr>
-              <a:t> </a:t>
-            </a:r>
-            <a:r>
-              <a:rPr lang="ru-RU" sz="4000" dirty="0" smtClean="0">
-                <a:latin typeface="+mj-lt"/>
-              </a:rPr>
-              <a:t>ефективності</a:t>
+              <a:t> ефективності</a:t>
             </a:r>
             <a:r>
               <a:rPr lang="en-US" sz="4000" dirty="0" smtClean="0">
@@ -21807,13 +21783,7 @@
               <a:rPr lang="ru-RU" altLang="ru-RU" sz="2800" dirty="0" smtClean="0">
                 <a:latin typeface="Corbel" panose="020B0503020204020204" pitchFamily="34" charset="0"/>
               </a:rPr>
-              <a:t> </a:t>
-            </a:r>
-            <a:r>
-              <a:rPr lang="ru-RU" altLang="ru-RU" sz="2800" dirty="0" smtClean="0">
-                <a:latin typeface="Corbel" panose="020B0503020204020204" pitchFamily="34" charset="0"/>
-              </a:rPr>
-              <a:t>(Індикатор швидкості роботи алгоритму)</a:t>
+              <a:t> (Індикатор швидкості роботи алгоритму)</a:t>
             </a:r>
           </a:p>
           <a:p>
@@ -21832,13 +21802,7 @@
               <a:rPr lang="ru-RU" altLang="ru-RU" sz="2800" dirty="0" smtClean="0">
                 <a:latin typeface="Corbel" panose="020B0503020204020204" pitchFamily="34" charset="0"/>
               </a:rPr>
-              <a:t> </a:t>
-            </a:r>
-            <a:r>
-              <a:rPr lang="ru-RU" altLang="ru-RU" sz="2800" dirty="0" smtClean="0">
-                <a:latin typeface="Corbel" panose="020B0503020204020204" pitchFamily="34" charset="0"/>
-              </a:rPr>
-              <a:t>(Скільки для алгоритму потрібно оперативної пам'яті)</a:t>
+              <a:t> (Скільки для алгоритму потрібно оперативної пам'яті)</a:t>
             </a:r>
           </a:p>
           <a:p>
@@ -21877,13 +21841,7 @@
               <a:rPr lang="ru-RU" altLang="ru-RU" sz="2800" dirty="0" smtClean="0">
                 <a:latin typeface="Corbel" panose="020B0503020204020204" pitchFamily="34" charset="0"/>
               </a:rPr>
-              <a:t> </a:t>
-            </a:r>
-            <a:r>
-              <a:rPr lang="ru-RU" altLang="ru-RU" sz="2800" dirty="0" smtClean="0">
-                <a:latin typeface="Corbel" panose="020B0503020204020204" pitchFamily="34" charset="0"/>
-              </a:rPr>
-              <a:t>ефективність.</a:t>
+              <a:t> ефективність.</a:t>
             </a:r>
           </a:p>
         </p:txBody>
@@ -21985,13 +21943,7 @@
               <a:rPr lang="ru-RU" altLang="ru-RU" b="1" dirty="0" smtClean="0">
                 <a:latin typeface="Corbel" panose="020B0503020204020204" pitchFamily="34" charset="0"/>
               </a:rPr>
-              <a:t>Часова </a:t>
-            </a:r>
-            <a:r>
-              <a:rPr lang="ru-RU" altLang="ru-RU" b="1" dirty="0" smtClean="0">
-                <a:latin typeface="Corbel" panose="020B0503020204020204" pitchFamily="34" charset="0"/>
-              </a:rPr>
-              <a:t>ефективність</a:t>
+              <a:t>Часова ефективність</a:t>
             </a:r>
             <a:r>
               <a:rPr lang="ru-RU" altLang="ru-RU" dirty="0" smtClean="0">
@@ -22685,7 +22637,7 @@
           <a:graphicData uri="http://schemas.openxmlformats.org/presentationml/2006/ole">
             <mc:AlternateContent xmlns:mc="http://schemas.openxmlformats.org/markup-compatibility/2006">
               <mc:Choice xmlns:v="urn:schemas-microsoft-com:vml" Requires="v">
-                <p:oleObj spid="_x0000_s1040" name="Equation" r:id="rId3" imgW="927000" imgH="241200" progId="Equation.DSMT4">
+                <p:oleObj spid="_x0000_s1041" name="Equation" r:id="rId3" imgW="927000" imgH="241200" progId="Equation.DSMT4">
                   <p:embed/>
                 </p:oleObj>
               </mc:Choice>
@@ -22890,13 +22842,7 @@
               <a:rPr lang="ru-RU" altLang="ru-RU" sz="2800" dirty="0" smtClean="0">
                 <a:latin typeface="Corbel" panose="020B0503020204020204" pitchFamily="34" charset="0"/>
               </a:rPr>
-              <a:t> не </a:t>
-            </a:r>
-            <a:r>
-              <a:rPr lang="ru-RU" altLang="ru-RU" sz="2800" dirty="0" smtClean="0">
-                <a:latin typeface="Corbel" panose="020B0503020204020204" pitchFamily="34" charset="0"/>
-              </a:rPr>
-              <a:t>всі операції, а лише </a:t>
+              <a:t> не всі операції, а лише </a:t>
             </a:r>
             <a:r>
               <a:rPr lang="ru-RU" altLang="ru-RU" sz="2800" b="1" i="1" dirty="0" smtClean="0">
@@ -23031,9 +22977,6 @@
               </a:rPr>
               <a:t>:</a:t>
             </a:r>
-            <a:endParaRPr lang="ru-RU" altLang="ru-RU" sz="2800" u="sng" dirty="0" smtClean="0">
-              <a:latin typeface="Corbel" panose="020B0503020204020204" pitchFamily="34" charset="0"/>
-            </a:endParaRPr>
           </a:p>
           <a:p>
             <a:pPr>
@@ -23537,7 +23480,7 @@
           <a:graphicData uri="http://schemas.openxmlformats.org/presentationml/2006/ole">
             <mc:AlternateContent xmlns:mc="http://schemas.openxmlformats.org/markup-compatibility/2006">
               <mc:Choice xmlns:v="urn:schemas-microsoft-com:vml" Requires="v">
-                <p:oleObj spid="_x0000_s2064" name="Equation" r:id="rId3" imgW="888614" imgH="215806" progId="Equation.DSMT4">
+                <p:oleObj spid="_x0000_s2065" name="Equation" r:id="rId3" imgW="888614" imgH="215806" progId="Equation.DSMT4">
                   <p:embed/>
                 </p:oleObj>
               </mc:Choice>
@@ -23831,7 +23774,7 @@
           <a:graphicData uri="http://schemas.openxmlformats.org/presentationml/2006/ole">
             <mc:AlternateContent xmlns:mc="http://schemas.openxmlformats.org/markup-compatibility/2006">
               <mc:Choice xmlns:v="urn:schemas-microsoft-com:vml" Requires="v">
-                <p:oleObj spid="_x0000_s3102" name="Формула" r:id="rId3" imgW="723586" imgH="393529" progId="Equation.3">
+                <p:oleObj spid="_x0000_s3104" name="Формула" r:id="rId3" imgW="723586" imgH="393529" progId="Equation.3">
                   <p:embed/>
                 </p:oleObj>
               </mc:Choice>
@@ -23930,7 +23873,7 @@
           <a:graphicData uri="http://schemas.openxmlformats.org/presentationml/2006/ole">
             <mc:AlternateContent xmlns:mc="http://schemas.openxmlformats.org/markup-compatibility/2006">
               <mc:Choice xmlns:v="urn:schemas-microsoft-com:vml" Requires="v">
-                <p:oleObj spid="_x0000_s3103" name="Формула" r:id="rId5" imgW="1955800" imgH="762000" progId="Equation.3">
+                <p:oleObj spid="_x0000_s3105" name="Формула" r:id="rId5" imgW="1955800" imgH="762000" progId="Equation.3">
                   <p:embed/>
                 </p:oleObj>
               </mc:Choice>
@@ -24540,13 +24483,7 @@
               <a:rPr lang="ru-RU" sz="4000" dirty="0" smtClean="0">
                 <a:latin typeface="+mj-lt"/>
               </a:rPr>
-              <a:t> </a:t>
-            </a:r>
-            <a:r>
-              <a:rPr lang="ru-RU" sz="4000" dirty="0" smtClean="0">
-                <a:latin typeface="+mj-lt"/>
-              </a:rPr>
-              <a:t>складності</a:t>
+              <a:t> складності</a:t>
             </a:r>
             <a:endParaRPr lang="ru-RU" sz="4000" dirty="0">
               <a:latin typeface="+mj-lt"/>
@@ -24638,13 +24575,7 @@
               <a:rPr lang="ru-RU" sz="2400" dirty="0" smtClean="0">
                 <a:latin typeface="+mn-lt"/>
               </a:rPr>
-              <a:t> </a:t>
-            </a:r>
-            <a:r>
-              <a:rPr lang="ru-RU" sz="2400" dirty="0" smtClean="0">
-                <a:latin typeface="+mn-lt"/>
-              </a:rPr>
-              <a:t>- константа</a:t>
+              <a:t> - константа</a:t>
             </a:r>
           </a:p>
           <a:p>
@@ -24703,13 +24634,7 @@
               <a:rPr lang="ru-RU" sz="2400" dirty="0" smtClean="0">
                 <a:latin typeface="+mn-lt"/>
               </a:rPr>
-              <a:t>, </a:t>
-            </a:r>
-            <a:r>
-              <a:rPr lang="ru-RU" sz="2400" dirty="0" smtClean="0">
-                <a:latin typeface="+mn-lt"/>
-              </a:rPr>
-              <a:t>це означає що </a:t>
+              <a:t>, це означає що </a:t>
             </a:r>
             <a:endParaRPr lang="en-US" sz="2400" dirty="0" smtClean="0">
               <a:latin typeface="+mn-lt"/>
@@ -24900,7 +24825,7 @@
           <a:graphicData uri="http://schemas.openxmlformats.org/presentationml/2006/ole">
             <mc:AlternateContent xmlns:mc="http://schemas.openxmlformats.org/markup-compatibility/2006">
               <mc:Choice xmlns:v="urn:schemas-microsoft-com:vml" Requires="v">
-                <p:oleObj spid="_x0000_s4126" name="Формула" r:id="rId3" imgW="850531" imgH="418918" progId="Equation.3">
+                <p:oleObj spid="_x0000_s4128" name="Формула" r:id="rId3" imgW="850531" imgH="418918" progId="Equation.3">
                   <p:embed/>
                 </p:oleObj>
               </mc:Choice>
@@ -24999,7 +24924,7 @@
           <a:graphicData uri="http://schemas.openxmlformats.org/presentationml/2006/ole">
             <mc:AlternateContent xmlns:mc="http://schemas.openxmlformats.org/markup-compatibility/2006">
               <mc:Choice xmlns:v="urn:schemas-microsoft-com:vml" Requires="v">
-                <p:oleObj spid="_x0000_s4127" name="Формула" r:id="rId5" imgW="939392" imgH="215806" progId="Equation.3">
+                <p:oleObj spid="_x0000_s4129" name="Формула" r:id="rId5" imgW="939392" imgH="215806" progId="Equation.3">
                   <p:embed/>
                 </p:oleObj>
               </mc:Choice>
@@ -25146,13 +25071,7 @@
               <a:rPr lang="ru-RU" sz="4000" dirty="0" smtClean="0">
                 <a:latin typeface="+mj-lt"/>
               </a:rPr>
-              <a:t> </a:t>
-            </a:r>
-            <a:r>
-              <a:rPr lang="ru-RU" sz="4000" dirty="0" smtClean="0">
-                <a:latin typeface="+mj-lt"/>
-              </a:rPr>
-              <a:t>складності</a:t>
+              <a:t> складності</a:t>
             </a:r>
             <a:endParaRPr lang="ru-RU" sz="4000" dirty="0">
               <a:latin typeface="+mj-lt"/>
@@ -25767,7 +25686,7 @@
           <a:graphicData uri="http://schemas.openxmlformats.org/presentationml/2006/ole">
             <mc:AlternateContent xmlns:mc="http://schemas.openxmlformats.org/markup-compatibility/2006">
               <mc:Choice xmlns:v="urn:schemas-microsoft-com:vml" Requires="v">
-                <p:oleObj spid="_x0000_s5136" name="Формула" r:id="rId3" imgW="939392" imgH="215806" progId="Equation.3">
+                <p:oleObj spid="_x0000_s5137" name="Формула" r:id="rId3" imgW="939392" imgH="215806" progId="Equation.3">
                   <p:embed/>
                 </p:oleObj>
               </mc:Choice>
@@ -25929,91 +25848,16 @@
         </p:spPr>
         <p:txBody>
           <a:bodyPr>
-            <a:normAutofit fontScale="92500" lnSpcReduction="20000"/>
+            <a:normAutofit lnSpcReduction="10000"/>
           </a:bodyPr>
           <a:lstStyle/>
           <a:p>
             <a:r>
-              <a:rPr lang="en-US" dirty="0"/>
-              <a:t>Julian Smart, Kevin </a:t>
-            </a:r>
-            <a:r>
-              <a:rPr lang="en-US" dirty="0" smtClean="0"/>
-              <a:t>Hock, </a:t>
-            </a:r>
-            <a:r>
-              <a:rPr lang="en-US" dirty="0"/>
-              <a:t>Stefan </a:t>
-            </a:r>
-            <a:r>
-              <a:rPr lang="en-US" dirty="0" err="1" smtClean="0"/>
-              <a:t>Csomor</a:t>
-            </a:r>
-            <a:r>
-              <a:rPr lang="uk-UA" dirty="0" smtClean="0"/>
-              <a:t>. </a:t>
-            </a:r>
-            <a:r>
-              <a:rPr lang="en-US" dirty="0" smtClean="0"/>
-              <a:t>Cross-Platform GUI Programming</a:t>
-            </a:r>
-            <a:r>
-              <a:rPr lang="uk-UA" dirty="0" smtClean="0"/>
-              <a:t> </a:t>
-            </a:r>
-            <a:r>
-              <a:rPr lang="en-US" dirty="0" smtClean="0"/>
-              <a:t>with </a:t>
-            </a:r>
-            <a:r>
-              <a:rPr lang="en-US" dirty="0" err="1" smtClean="0"/>
-              <a:t>wxWidgets</a:t>
-            </a:r>
-            <a:r>
-              <a:rPr lang="uk-UA" dirty="0" smtClean="0"/>
-              <a:t>. </a:t>
-            </a:r>
-            <a:r>
-              <a:rPr lang="en-US" dirty="0" smtClean="0"/>
-              <a:t>Prentice </a:t>
-            </a:r>
-            <a:r>
-              <a:rPr lang="en-US" dirty="0"/>
-              <a:t>Hall </a:t>
-            </a:r>
-            <a:r>
-              <a:rPr lang="en-US" dirty="0" smtClean="0"/>
-              <a:t>Professional</a:t>
-            </a:r>
-            <a:r>
-              <a:rPr lang="ru-RU" dirty="0"/>
-              <a:t>,</a:t>
-            </a:r>
-            <a:r>
-              <a:rPr lang="en-US" dirty="0" smtClean="0"/>
-              <a:t> </a:t>
-            </a:r>
-            <a:r>
-              <a:rPr lang="uk-UA" dirty="0" smtClean="0"/>
-              <a:t>2005. - 744 </a:t>
-            </a:r>
-            <a:r>
-              <a:rPr lang="en-US" dirty="0" smtClean="0"/>
-              <a:t>p</a:t>
+              <a:rPr lang="ru-RU" dirty="0" err="1" smtClean="0"/>
+              <a:t>Лафоре</a:t>
             </a:r>
             <a:r>
               <a:rPr lang="ru-RU" dirty="0" smtClean="0"/>
-              <a:t>.</a:t>
-            </a:r>
-            <a:endParaRPr lang="en-US" dirty="0" smtClean="0"/>
-          </a:p>
-          <a:p>
-            <a:r>
-              <a:rPr lang="ru-RU" dirty="0" err="1"/>
-              <a:t>Лафоре</a:t>
-            </a:r>
-            <a:r>
-              <a:rPr lang="ru-RU" dirty="0"/>
               <a:t> </a:t>
             </a:r>
             <a:r>
@@ -26333,9 +26177,6 @@
               </a:rPr>
               <a:t>, </a:t>
             </a:r>
-            <a:endParaRPr lang="ru-RU" altLang="ru-RU" sz="2300" dirty="0" smtClean="0">
-              <a:latin typeface="Corbel" panose="020B0503020204020204" pitchFamily="34" charset="0"/>
-            </a:endParaRPr>
           </a:p>
           <a:p>
             <a:pPr>
@@ -26349,13 +26190,7 @@
               <a:rPr lang="ru-RU" altLang="ru-RU" sz="2300" dirty="0" smtClean="0">
                 <a:latin typeface="Corbel" panose="020B0503020204020204" pitchFamily="34" charset="0"/>
               </a:rPr>
-              <a:t>Тому </a:t>
-            </a:r>
-            <a:r>
-              <a:rPr lang="ru-RU" altLang="ru-RU" sz="2300" dirty="0" smtClean="0">
-                <a:latin typeface="Corbel" panose="020B0503020204020204" pitchFamily="34" charset="0"/>
-              </a:rPr>
-              <a:t>що </a:t>
+              <a:t>Тому що </a:t>
             </a:r>
             <a:endParaRPr lang="en-US" altLang="ru-RU" sz="2300" dirty="0" smtClean="0">
               <a:latin typeface="Gill Sans MT" panose="020B0502020104020203" pitchFamily="34" charset="0"/>
@@ -26403,13 +26238,7 @@
               <a:rPr lang="ru-RU" altLang="ru-RU" sz="2300" dirty="0" smtClean="0">
                 <a:latin typeface="Corbel" panose="020B0503020204020204" pitchFamily="34" charset="0"/>
               </a:rPr>
-              <a:t>, тому </a:t>
-            </a:r>
-            <a:r>
-              <a:rPr lang="ru-RU" altLang="ru-RU" sz="2300" dirty="0" smtClean="0">
-                <a:latin typeface="Corbel" panose="020B0503020204020204" pitchFamily="34" charset="0"/>
-              </a:rPr>
-              <a:t>що</a:t>
+              <a:t>, тому що</a:t>
             </a:r>
             <a:r>
               <a:rPr lang="en-US" altLang="ru-RU" sz="2300" dirty="0" smtClean="0">
@@ -26475,7 +26304,7 @@
           <a:graphicData uri="http://schemas.openxmlformats.org/presentationml/2006/ole">
             <mc:AlternateContent xmlns:mc="http://schemas.openxmlformats.org/markup-compatibility/2006">
               <mc:Choice xmlns:v="urn:schemas-microsoft-com:vml" Requires="v">
-                <p:oleObj spid="_x0000_s6188" name="Формула" r:id="rId3" imgW="1066337" imgH="393529" progId="Equation.3">
+                <p:oleObj spid="_x0000_s6191" name="Формула" r:id="rId3" imgW="1066337" imgH="393529" progId="Equation.3">
                   <p:embed/>
                 </p:oleObj>
               </mc:Choice>
@@ -26574,7 +26403,7 @@
           <a:graphicData uri="http://schemas.openxmlformats.org/presentationml/2006/ole">
             <mc:AlternateContent xmlns:mc="http://schemas.openxmlformats.org/markup-compatibility/2006">
               <mc:Choice xmlns:v="urn:schemas-microsoft-com:vml" Requires="v">
-                <p:oleObj spid="_x0000_s6189" name="Формула" r:id="rId5" imgW="3162300" imgH="444500" progId="Equation.3">
+                <p:oleObj spid="_x0000_s6192" name="Формула" r:id="rId5" imgW="3162300" imgH="444500" progId="Equation.3">
                   <p:embed/>
                 </p:oleObj>
               </mc:Choice>
@@ -26673,7 +26502,7 @@
           <a:graphicData uri="http://schemas.openxmlformats.org/presentationml/2006/ole">
             <mc:AlternateContent xmlns:mc="http://schemas.openxmlformats.org/markup-compatibility/2006">
               <mc:Choice xmlns:v="urn:schemas-microsoft-com:vml" Requires="v">
-                <p:oleObj spid="_x0000_s6190" name="Формула" r:id="rId7" imgW="2743200" imgH="393700" progId="Equation.3">
+                <p:oleObj spid="_x0000_s6193" name="Формула" r:id="rId7" imgW="2743200" imgH="393700" progId="Equation.3">
                   <p:embed/>
                 </p:oleObj>
               </mc:Choice>
@@ -26927,7 +26756,7 @@
           <a:graphicData uri="http://schemas.openxmlformats.org/presentationml/2006/ole">
             <mc:AlternateContent xmlns:mc="http://schemas.openxmlformats.org/markup-compatibility/2006">
               <mc:Choice xmlns:v="urn:schemas-microsoft-com:vml" Requires="v">
-                <p:oleObj spid="_x0000_s7212" name="Формула" r:id="rId3" imgW="545626" imgH="266469" progId="Equation.3">
+                <p:oleObj spid="_x0000_s7215" name="Формула" r:id="rId3" imgW="545626" imgH="266469" progId="Equation.3">
                   <p:embed/>
                 </p:oleObj>
               </mc:Choice>
@@ -27026,7 +26855,7 @@
           <a:graphicData uri="http://schemas.openxmlformats.org/presentationml/2006/ole">
             <mc:AlternateContent xmlns:mc="http://schemas.openxmlformats.org/markup-compatibility/2006">
               <mc:Choice xmlns:v="urn:schemas-microsoft-com:vml" Requires="v">
-                <p:oleObj spid="_x0000_s7213" name="Формула" r:id="rId5" imgW="939392" imgH="241195" progId="Equation.3">
+                <p:oleObj spid="_x0000_s7216" name="Формула" r:id="rId5" imgW="939392" imgH="241195" progId="Equation.3">
                   <p:embed/>
                 </p:oleObj>
               </mc:Choice>
@@ -27125,7 +26954,7 @@
           <a:graphicData uri="http://schemas.openxmlformats.org/presentationml/2006/ole">
             <mc:AlternateContent xmlns:mc="http://schemas.openxmlformats.org/markup-compatibility/2006">
               <mc:Choice xmlns:v="urn:schemas-microsoft-com:vml" Requires="v">
-                <p:oleObj spid="_x0000_s7214" name="Формула" r:id="rId7" imgW="622030" imgH="203112" progId="Equation.3">
+                <p:oleObj spid="_x0000_s7217" name="Формула" r:id="rId7" imgW="622030" imgH="203112" progId="Equation.3">
                   <p:embed/>
                 </p:oleObj>
               </mc:Choice>
@@ -27607,7 +27436,7 @@
           <a:graphicData uri="http://schemas.openxmlformats.org/presentationml/2006/ole">
             <mc:AlternateContent xmlns:mc="http://schemas.openxmlformats.org/markup-compatibility/2006">
               <mc:Choice xmlns:v="urn:schemas-microsoft-com:vml" Requires="v">
-                <p:oleObj spid="_x0000_s8250" name="Формула" r:id="rId3" imgW="901309" imgH="431613" progId="Equation.3">
+                <p:oleObj spid="_x0000_s8254" name="Формула" r:id="rId3" imgW="901309" imgH="431613" progId="Equation.3">
                   <p:embed/>
                 </p:oleObj>
               </mc:Choice>
@@ -27700,7 +27529,7 @@
           <a:graphicData uri="http://schemas.openxmlformats.org/presentationml/2006/ole">
             <mc:AlternateContent xmlns:mc="http://schemas.openxmlformats.org/markup-compatibility/2006">
               <mc:Choice xmlns:v="urn:schemas-microsoft-com:vml" Requires="v">
-                <p:oleObj spid="_x0000_s8251" name="Формула" r:id="rId5" imgW="876300" imgH="431800" progId="Equation.3">
+                <p:oleObj spid="_x0000_s8255" name="Формула" r:id="rId5" imgW="876300" imgH="431800" progId="Equation.3">
                   <p:embed/>
                 </p:oleObj>
               </mc:Choice>
@@ -27793,7 +27622,7 @@
           <a:graphicData uri="http://schemas.openxmlformats.org/presentationml/2006/ole">
             <mc:AlternateContent xmlns:mc="http://schemas.openxmlformats.org/markup-compatibility/2006">
               <mc:Choice xmlns:v="urn:schemas-microsoft-com:vml" Requires="v">
-                <p:oleObj spid="_x0000_s8252" name="Формула" r:id="rId7" imgW="1091726" imgH="431613" progId="Equation.3">
+                <p:oleObj spid="_x0000_s8256" name="Формула" r:id="rId7" imgW="1091726" imgH="431613" progId="Equation.3">
                   <p:embed/>
                 </p:oleObj>
               </mc:Choice>
@@ -27886,7 +27715,7 @@
           <a:graphicData uri="http://schemas.openxmlformats.org/presentationml/2006/ole">
             <mc:AlternateContent xmlns:mc="http://schemas.openxmlformats.org/markup-compatibility/2006">
               <mc:Choice xmlns:v="urn:schemas-microsoft-com:vml" Requires="v">
-                <p:oleObj spid="_x0000_s8253" name="Формула" r:id="rId9" imgW="1587500" imgH="431800" progId="Equation.3">
+                <p:oleObj spid="_x0000_s8257" name="Формула" r:id="rId9" imgW="1587500" imgH="431800" progId="Equation.3">
                   <p:embed/>
                 </p:oleObj>
               </mc:Choice>
@@ -28401,7 +28230,7 @@
           <a:graphicData uri="http://schemas.openxmlformats.org/presentationml/2006/ole">
             <mc:AlternateContent xmlns:mc="http://schemas.openxmlformats.org/markup-compatibility/2006">
               <mc:Choice xmlns:v="urn:schemas-microsoft-com:vml" Requires="v">
-                <p:oleObj spid="_x0000_s9232" name="Формула" r:id="rId3" imgW="2438400" imgH="431800" progId="Equation.3">
+                <p:oleObj spid="_x0000_s9233" name="Формула" r:id="rId3" imgW="2438400" imgH="431800" progId="Equation.3">
                   <p:embed/>
                 </p:oleObj>
               </mc:Choice>
@@ -29133,7 +28962,7 @@
           <a:graphicData uri="http://schemas.openxmlformats.org/presentationml/2006/ole">
             <mc:AlternateContent xmlns:mc="http://schemas.openxmlformats.org/markup-compatibility/2006">
               <mc:Choice xmlns:v="urn:schemas-microsoft-com:vml" Requires="v">
-                <p:oleObj spid="_x0000_s10270" name="Формула" r:id="rId3" imgW="2654300" imgH="1752600" progId="Equation.3">
+                <p:oleObj spid="_x0000_s10272" name="Формула" r:id="rId3" imgW="2654300" imgH="1752600" progId="Equation.3">
                   <p:embed/>
                 </p:oleObj>
               </mc:Choice>
@@ -29226,7 +29055,7 @@
           <a:graphicData uri="http://schemas.openxmlformats.org/presentationml/2006/ole">
             <mc:AlternateContent xmlns:mc="http://schemas.openxmlformats.org/markup-compatibility/2006">
               <mc:Choice xmlns:v="urn:schemas-microsoft-com:vml" Requires="v">
-                <p:oleObj spid="_x0000_s10271" name="Формула" r:id="rId5" imgW="1079500" imgH="228600" progId="Equation.3">
+                <p:oleObj spid="_x0000_s10273" name="Формула" r:id="rId5" imgW="1079500" imgH="228600" progId="Equation.3">
                   <p:embed/>
                 </p:oleObj>
               </mc:Choice>
@@ -29554,28 +29383,7 @@
                 <a:latin typeface="Courier New" panose="02070309020205020404" pitchFamily="49" charset="0"/>
                 <a:cs typeface="Courier New" panose="02070309020205020404" pitchFamily="49" charset="0"/>
               </a:rPr>
-              <a:t> j </a:t>
-            </a:r>
-            <a:r>
-              <a:rPr lang="en-US" altLang="ru-RU" sz="2400" dirty="0" smtClean="0">
-                <a:latin typeface="Courier New" panose="02070309020205020404" pitchFamily="49" charset="0"/>
-                <a:cs typeface="Courier New" panose="02070309020205020404" pitchFamily="49" charset="0"/>
-              </a:rPr>
-              <a:t>= 0; j </a:t>
-            </a:r>
-            <a:r>
-              <a:rPr lang="en-US" altLang="ru-RU" sz="2400" dirty="0" smtClean="0">
-                <a:latin typeface="Courier New" panose="02070309020205020404" pitchFamily="49" charset="0"/>
-                <a:cs typeface="Courier New" panose="02070309020205020404" pitchFamily="49" charset="0"/>
-              </a:rPr>
-              <a:t>&lt;N; </a:t>
-            </a:r>
-            <a:r>
-              <a:rPr lang="en-US" altLang="ru-RU" sz="2400" dirty="0" smtClean="0">
-                <a:latin typeface="Courier New" panose="02070309020205020404" pitchFamily="49" charset="0"/>
-                <a:cs typeface="Courier New" panose="02070309020205020404" pitchFamily="49" charset="0"/>
-              </a:rPr>
-              <a:t>j ++) {</a:t>
+              <a:t> j = 0; j &lt;N; j ++) {</a:t>
             </a:r>
             <a:r>
               <a:rPr lang="ru-RU" altLang="ru-RU" sz="2400" dirty="0" smtClean="0">
@@ -29647,14 +29455,7 @@
                 <a:latin typeface="Courier New" panose="02070309020205020404" pitchFamily="49" charset="0"/>
                 <a:cs typeface="Courier New" panose="02070309020205020404" pitchFamily="49" charset="0"/>
               </a:rPr>
-              <a:t>] </a:t>
-            </a:r>
-            <a:r>
-              <a:rPr lang="en-US" altLang="ru-RU" sz="2400" dirty="0" smtClean="0">
-                <a:latin typeface="Courier New" panose="02070309020205020404" pitchFamily="49" charset="0"/>
-                <a:cs typeface="Courier New" panose="02070309020205020404" pitchFamily="49" charset="0"/>
-              </a:rPr>
-              <a:t>= 0;</a:t>
+              <a:t>] = 0;</a:t>
             </a:r>
           </a:p>
           <a:p>
@@ -29684,28 +29485,7 @@
                 <a:latin typeface="Courier New" panose="02070309020205020404" pitchFamily="49" charset="0"/>
                 <a:cs typeface="Courier New" panose="02070309020205020404" pitchFamily="49" charset="0"/>
               </a:rPr>
-              <a:t> k </a:t>
-            </a:r>
-            <a:r>
-              <a:rPr lang="en-US" altLang="ru-RU" sz="2400" dirty="0" smtClean="0">
-                <a:latin typeface="Courier New" panose="02070309020205020404" pitchFamily="49" charset="0"/>
-                <a:cs typeface="Courier New" panose="02070309020205020404" pitchFamily="49" charset="0"/>
-              </a:rPr>
-              <a:t>= 0; k </a:t>
-            </a:r>
-            <a:r>
-              <a:rPr lang="en-US" altLang="ru-RU" sz="2400" dirty="0" smtClean="0">
-                <a:latin typeface="Courier New" panose="02070309020205020404" pitchFamily="49" charset="0"/>
-                <a:cs typeface="Courier New" panose="02070309020205020404" pitchFamily="49" charset="0"/>
-              </a:rPr>
-              <a:t>&lt;N; </a:t>
-            </a:r>
-            <a:r>
-              <a:rPr lang="en-US" altLang="ru-RU" sz="2400" dirty="0" smtClean="0">
-                <a:latin typeface="Courier New" panose="02070309020205020404" pitchFamily="49" charset="0"/>
-                <a:cs typeface="Courier New" panose="02070309020205020404" pitchFamily="49" charset="0"/>
-              </a:rPr>
-              <a:t>k ++)</a:t>
+              <a:t> k = 0; k &lt;N; k ++)</a:t>
             </a:r>
           </a:p>
           <a:p>
@@ -29721,14 +29501,21 @@
                 <a:latin typeface="Courier New" panose="02070309020205020404" pitchFamily="49" charset="0"/>
                 <a:cs typeface="Courier New" panose="02070309020205020404" pitchFamily="49" charset="0"/>
               </a:rPr>
-              <a:t> </a:t>
+              <a:t> C[</a:t>
+            </a:r>
+            <a:r>
+              <a:rPr lang="en-US" altLang="ru-RU" sz="2400" dirty="0" err="1" smtClean="0">
+                <a:latin typeface="Courier New" panose="02070309020205020404" pitchFamily="49" charset="0"/>
+                <a:cs typeface="Courier New" panose="02070309020205020404" pitchFamily="49" charset="0"/>
+              </a:rPr>
+              <a:t>i</a:t>
             </a:r>
             <a:r>
               <a:rPr lang="en-US" altLang="ru-RU" sz="2400" dirty="0" smtClean="0">
                 <a:latin typeface="Courier New" panose="02070309020205020404" pitchFamily="49" charset="0"/>
                 <a:cs typeface="Courier New" panose="02070309020205020404" pitchFamily="49" charset="0"/>
               </a:rPr>
-              <a:t>C[</a:t>
+              <a:t>][J] = C[</a:t>
             </a:r>
             <a:r>
               <a:rPr lang="en-US" altLang="ru-RU" sz="2400" dirty="0" err="1" smtClean="0">
@@ -29742,84 +29529,21 @@
                 <a:latin typeface="Courier New" panose="02070309020205020404" pitchFamily="49" charset="0"/>
                 <a:cs typeface="Courier New" panose="02070309020205020404" pitchFamily="49" charset="0"/>
               </a:rPr>
-              <a:t>][</a:t>
+              <a:t>][J] + A[</a:t>
+            </a:r>
+            <a:r>
+              <a:rPr lang="en-US" altLang="ru-RU" sz="2400" dirty="0" err="1" smtClean="0">
+                <a:latin typeface="Courier New" panose="02070309020205020404" pitchFamily="49" charset="0"/>
+                <a:cs typeface="Courier New" panose="02070309020205020404" pitchFamily="49" charset="0"/>
+              </a:rPr>
+              <a:t>i</a:t>
             </a:r>
             <a:r>
               <a:rPr lang="en-US" altLang="ru-RU" sz="2400" dirty="0" smtClean="0">
                 <a:latin typeface="Courier New" panose="02070309020205020404" pitchFamily="49" charset="0"/>
                 <a:cs typeface="Courier New" panose="02070309020205020404" pitchFamily="49" charset="0"/>
               </a:rPr>
-              <a:t>J] = </a:t>
-            </a:r>
-            <a:r>
-              <a:rPr lang="en-US" altLang="ru-RU" sz="2400" dirty="0" smtClean="0">
-                <a:latin typeface="Courier New" panose="02070309020205020404" pitchFamily="49" charset="0"/>
-                <a:cs typeface="Courier New" panose="02070309020205020404" pitchFamily="49" charset="0"/>
-              </a:rPr>
-              <a:t>C[</a:t>
-            </a:r>
-            <a:r>
-              <a:rPr lang="en-US" altLang="ru-RU" sz="2400" dirty="0" err="1" smtClean="0">
-                <a:latin typeface="Courier New" panose="02070309020205020404" pitchFamily="49" charset="0"/>
-                <a:cs typeface="Courier New" panose="02070309020205020404" pitchFamily="49" charset="0"/>
-              </a:rPr>
-              <a:t>i</a:t>
-            </a:r>
-            <a:r>
-              <a:rPr lang="en-US" altLang="ru-RU" sz="2400" dirty="0" smtClean="0">
-                <a:latin typeface="Courier New" panose="02070309020205020404" pitchFamily="49" charset="0"/>
-                <a:cs typeface="Courier New" panose="02070309020205020404" pitchFamily="49" charset="0"/>
-              </a:rPr>
-              <a:t>][</a:t>
-            </a:r>
-            <a:r>
-              <a:rPr lang="en-US" altLang="ru-RU" sz="2400" dirty="0" smtClean="0">
-                <a:latin typeface="Courier New" panose="02070309020205020404" pitchFamily="49" charset="0"/>
-                <a:cs typeface="Courier New" panose="02070309020205020404" pitchFamily="49" charset="0"/>
-              </a:rPr>
-              <a:t>J] + </a:t>
-            </a:r>
-            <a:r>
-              <a:rPr lang="en-US" altLang="ru-RU" sz="2400" dirty="0" smtClean="0">
-                <a:latin typeface="Courier New" panose="02070309020205020404" pitchFamily="49" charset="0"/>
-                <a:cs typeface="Courier New" panose="02070309020205020404" pitchFamily="49" charset="0"/>
-              </a:rPr>
-              <a:t>A[</a:t>
-            </a:r>
-            <a:r>
-              <a:rPr lang="en-US" altLang="ru-RU" sz="2400" dirty="0" err="1" smtClean="0">
-                <a:latin typeface="Courier New" panose="02070309020205020404" pitchFamily="49" charset="0"/>
-                <a:cs typeface="Courier New" panose="02070309020205020404" pitchFamily="49" charset="0"/>
-              </a:rPr>
-              <a:t>i</a:t>
-            </a:r>
-            <a:r>
-              <a:rPr lang="en-US" altLang="ru-RU" sz="2400" dirty="0" smtClean="0">
-                <a:latin typeface="Courier New" panose="02070309020205020404" pitchFamily="49" charset="0"/>
-                <a:cs typeface="Courier New" panose="02070309020205020404" pitchFamily="49" charset="0"/>
-              </a:rPr>
-              <a:t>][k] </a:t>
-            </a:r>
-            <a:r>
-              <a:rPr lang="en-US" altLang="ru-RU" sz="2400" dirty="0" smtClean="0">
-                <a:latin typeface="Courier New" panose="02070309020205020404" pitchFamily="49" charset="0"/>
-                <a:cs typeface="Courier New" panose="02070309020205020404" pitchFamily="49" charset="0"/>
-              </a:rPr>
-              <a:t>* </a:t>
-            </a:r>
-            <a:r>
-              <a:rPr lang="en-US" altLang="ru-RU" sz="2400" dirty="0" smtClean="0">
-                <a:latin typeface="Courier New" panose="02070309020205020404" pitchFamily="49" charset="0"/>
-                <a:cs typeface="Courier New" panose="02070309020205020404" pitchFamily="49" charset="0"/>
-              </a:rPr>
-              <a:t>B[k][</a:t>
-            </a:r>
-            <a:r>
-              <a:rPr lang="en-US" altLang="ru-RU" sz="2400" dirty="0" smtClean="0">
-                <a:latin typeface="Courier New" panose="02070309020205020404" pitchFamily="49" charset="0"/>
-                <a:cs typeface="Courier New" panose="02070309020205020404" pitchFamily="49" charset="0"/>
-              </a:rPr>
-              <a:t>j];</a:t>
+              <a:t>][k] * B[k][j];</a:t>
             </a:r>
           </a:p>
           <a:p>
@@ -30339,7 +30063,7 @@
           <a:graphicData uri="http://schemas.openxmlformats.org/presentationml/2006/ole">
             <mc:AlternateContent xmlns:mc="http://schemas.openxmlformats.org/markup-compatibility/2006">
               <mc:Choice xmlns:v="urn:schemas-microsoft-com:vml" Requires="v">
-                <p:oleObj spid="_x0000_s11280" name="Формула" r:id="rId3" imgW="1358310" imgH="444307" progId="Equation.3">
+                <p:oleObj spid="_x0000_s11281" name="Формула" r:id="rId3" imgW="1358310" imgH="444307" progId="Equation.3">
                   <p:embed/>
                 </p:oleObj>
               </mc:Choice>
@@ -31753,11 +31477,7 @@
             <a:pPr eaLnBrk="1" hangingPunct="1"/>
             <a:r>
               <a:rPr lang="ru-RU" dirty="0" smtClean="0"/>
-              <a:t>Структура </a:t>
-            </a:r>
-            <a:r>
-              <a:rPr lang="ru-RU" dirty="0" smtClean="0"/>
-              <a:t>курсу</a:t>
+              <a:t>Структура курсу</a:t>
             </a:r>
           </a:p>
         </p:txBody>
@@ -31798,11 +31518,7 @@
             <a:pPr eaLnBrk="1" hangingPunct="1"/>
             <a:r>
               <a:rPr lang="ru-RU" dirty="0" smtClean="0"/>
-              <a:t>Основи кроссплатформенного програмування на базі С </a:t>
-            </a:r>
-            <a:r>
-              <a:rPr lang="ru-RU" dirty="0" smtClean="0"/>
-              <a:t>++ та </a:t>
+              <a:t>Основи кроссплатформенного програмування на базі С ++ та </a:t>
             </a:r>
             <a:r>
               <a:rPr lang="en-US" dirty="0" err="1" smtClean="0"/>
@@ -31866,11 +31582,7 @@
             <a:pPr eaLnBrk="1" hangingPunct="1"/>
             <a:r>
               <a:rPr lang="ru-RU" dirty="0" smtClean="0"/>
-              <a:t>В кінці семестру </a:t>
-            </a:r>
-            <a:r>
-              <a:rPr lang="ru-RU" dirty="0" smtClean="0"/>
-              <a:t>– </a:t>
+              <a:t>В кінці семестру – </a:t>
             </a:r>
             <a:r>
               <a:rPr lang="ru-RU" dirty="0" err="1" smtClean="0"/>
@@ -31892,7 +31604,6 @@
               <a:rPr lang="ru-RU" dirty="0" smtClean="0"/>
               <a:t>;</a:t>
             </a:r>
-            <a:endParaRPr lang="ru-RU" dirty="0" smtClean="0"/>
           </a:p>
           <a:p>
             <a:pPr eaLnBrk="1" hangingPunct="1"/>
@@ -31902,11 +31613,7 @@
             </a:r>
             <a:r>
               <a:rPr lang="ru-RU" dirty="0" smtClean="0"/>
-              <a:t> </a:t>
-            </a:r>
-            <a:r>
-              <a:rPr lang="ru-RU" dirty="0" smtClean="0"/>
-              <a:t>за іспит за рейтингом = </a:t>
+              <a:t> за іспит за рейтингом = </a:t>
             </a:r>
             <a:r>
               <a:rPr lang="en-US" dirty="0" smtClean="0"/>
@@ -31914,11 +31621,7 @@
             </a:r>
             <a:r>
               <a:rPr lang="ru-RU" dirty="0" smtClean="0"/>
-              <a:t>Тест </a:t>
-            </a:r>
-            <a:r>
-              <a:rPr lang="ru-RU" dirty="0" smtClean="0"/>
-              <a:t>+ </a:t>
+              <a:t>Тест + </a:t>
             </a:r>
             <a:r>
               <a:rPr lang="en-US" dirty="0" smtClean="0"/>
@@ -31930,17 +31633,8 @@
             </a:r>
             <a:r>
               <a:rPr lang="ru-RU" dirty="0" smtClean="0"/>
-              <a:t> </a:t>
-            </a:r>
-            <a:r>
-              <a:rPr lang="ru-RU" dirty="0" smtClean="0"/>
-              <a:t>за </a:t>
-            </a:r>
-            <a:r>
-              <a:rPr lang="ru-RU" dirty="0" smtClean="0"/>
-              <a:t>л/р.</a:t>
-            </a:r>
-            <a:endParaRPr lang="ru-RU" dirty="0" smtClean="0"/>
+              <a:t> за л/р.</a:t>
+            </a:r>
           </a:p>
           <a:p>
             <a:pPr eaLnBrk="1" hangingPunct="1">
@@ -32063,7 +31757,6 @@
               <a:rPr lang="ru-RU" dirty="0" smtClean="0"/>
               <a:t>;</a:t>
             </a:r>
-            <a:endParaRPr lang="ru-RU" dirty="0" smtClean="0"/>
           </a:p>
           <a:p>
             <a:pPr eaLnBrk="1" hangingPunct="1"/>
@@ -32120,15 +31813,7 @@
             </a:r>
             <a:r>
               <a:rPr lang="ru-RU" dirty="0" smtClean="0"/>
-              <a:t> </a:t>
-            </a:r>
-            <a:r>
-              <a:rPr lang="ru-RU" dirty="0" smtClean="0"/>
-              <a:t>л/р </a:t>
-            </a:r>
-            <a:r>
-              <a:rPr lang="ru-RU" dirty="0" smtClean="0"/>
-              <a:t>вважається та, що здана з позитивною оцінкою (3, 4, 5) протягом двох календарних тижнів з моменту </a:t>
+              <a:t> л/р вважається та, що здана з позитивною оцінкою (3, 4, 5) протягом двох календарних тижнів з моменту </a:t>
             </a:r>
             <a:r>
               <a:rPr lang="ru-RU" dirty="0" err="1" smtClean="0"/>
@@ -32146,7 +31831,6 @@
               <a:rPr lang="ru-RU" dirty="0" smtClean="0"/>
               <a:t>;</a:t>
             </a:r>
-            <a:endParaRPr lang="ru-RU" dirty="0" smtClean="0"/>
           </a:p>
         </p:txBody>
       </p:sp>
@@ -32391,7 +32075,11 @@
             </a:pPr>
             <a:r>
               <a:rPr lang="ru-RU" sz="2800" dirty="0" smtClean="0"/>
-              <a:t>Харків-2019</a:t>
+              <a:t>Харків-20</a:t>
+            </a:r>
+            <a:r>
+              <a:rPr lang="en-US" sz="2800" smtClean="0"/>
+              <a:t>20</a:t>
             </a:r>
             <a:endParaRPr lang="ru-RU" sz="2800" dirty="0"/>
           </a:p>
@@ -32678,7 +32366,6 @@
               <a:rPr lang="uk-UA" dirty="0" smtClean="0"/>
               <a:t> </a:t>
             </a:r>
-            <a:endParaRPr lang="uk-UA" dirty="0" smtClean="0"/>
           </a:p>
         </p:txBody>
       </p:sp>

</xml_diff>